<commit_message>
Commit med beta samt altar och sånt gött
yesyes
</commit_message>
<xml_diff>
--- a/Beta/Betapresentation.pptx
+++ b/Beta/Betapresentation.pptx
@@ -511,47 +511,37 @@
           <a:p>
             <a:r>
               <a:rPr lang="en-GB" dirty="0" smtClean="0"/>
-              <a:t>1.</a:t>
+              <a:t>Hello,</a:t>
             </a:r>
           </a:p>
           <a:p>
             <a:r>
               <a:rPr lang="en-GB" dirty="0" smtClean="0"/>
-              <a:t>Better workflow, more experienced in both</a:t>
+              <a:t>My</a:t>
             </a:r>
             <a:r>
               <a:rPr lang="en-GB" baseline="0" dirty="0" smtClean="0"/>
-              <a:t> programming and animating. Allowing for faster production. Also we have better communication between the programmers, so we check each others code more frequently and giving feedback.</a:t>
-            </a:r>
-          </a:p>
-          <a:p>
+              <a:t> name is André </a:t>
+            </a:r>
+            <a:r>
+              <a:rPr lang="en-GB" baseline="0" dirty="0" err="1" smtClean="0"/>
+              <a:t>Åström</a:t>
+            </a:r>
             <a:r>
               <a:rPr lang="en-GB" baseline="0" dirty="0" smtClean="0"/>
-              <a:t>2.</a:t>
-            </a:r>
-          </a:p>
-          <a:p>
-            <a:r>
-              <a:rPr lang="en-GB" dirty="0" smtClean="0"/>
-              <a:t>We got a start for simple soft coding in .txt files. Making</a:t>
-            </a:r>
+              <a:t>, and I am from group twelve.</a:t>
+            </a:r>
+          </a:p>
+          <a:p>
             <a:r>
               <a:rPr lang="en-GB" baseline="0" dirty="0" smtClean="0"/>
-              <a:t> it possible for both programmers and artists to playtest the game and making tweaks.</a:t>
-            </a:r>
-          </a:p>
-          <a:p>
-            <a:r>
-              <a:rPr lang="en-GB" baseline="0" dirty="0" smtClean="0"/>
-              <a:t>3.</a:t>
-            </a:r>
-          </a:p>
-          <a:p>
-            <a:r>
-              <a:rPr lang="en-GB" baseline="0" dirty="0" smtClean="0"/>
-              <a:t>Before we did not have someone who could be considered a dedicated designer, who could update the design document, but now we have someone who update it quite frequently. Giving it a better and more cohesive structure.</a:t>
-            </a:r>
-            <a:endParaRPr lang="en-GB" dirty="0"/>
+              <a:t>We chose the concept “Possession” from </a:t>
+            </a:r>
+            <a:r>
+              <a:rPr lang="en-GB" baseline="0" smtClean="0"/>
+              <a:t>group eight.</a:t>
+            </a:r>
+            <a:endParaRPr lang="en-GB"/>
           </a:p>
         </p:txBody>
       </p:sp>
@@ -572,7 +562,7 @@
           <a:p>
             <a:fld id="{6CC21AF7-C21A-416D-8B4F-6D6A47F3CA3A}" type="slidenum">
               <a:rPr lang="en-GB" smtClean="0"/>
-              <a:t>2</a:t>
+              <a:t>1</a:t>
             </a:fld>
             <a:endParaRPr lang="en-GB"/>
           </a:p>
@@ -581,7 +571,7 @@
     </p:spTree>
     <p:extLst>
       <p:ext uri="{BB962C8B-B14F-4D97-AF65-F5344CB8AC3E}">
-        <p14:creationId xmlns:p14="http://schemas.microsoft.com/office/powerpoint/2010/main" val="2782332422"/>
+        <p14:creationId xmlns:p14="http://schemas.microsoft.com/office/powerpoint/2010/main" val="4091193146"/>
       </p:ext>
     </p:extLst>
   </p:cSld>
@@ -643,19 +633,11 @@
           <a:p>
             <a:r>
               <a:rPr lang="en-GB" dirty="0" smtClean="0"/>
-              <a:t>We</a:t>
+              <a:t>Better workflow, more experienced in both</a:t>
             </a:r>
             <a:r>
               <a:rPr lang="en-GB" baseline="0" dirty="0" smtClean="0"/>
-              <a:t> got quite a lot of graphical components left to draw, and also some content left to put into the game such as power ups. With just two weeks left, this is getting stressful. When we want to have as much time possible for </a:t>
-            </a:r>
-            <a:r>
-              <a:rPr lang="en-GB" baseline="0" dirty="0" err="1" smtClean="0"/>
-              <a:t>playtesting</a:t>
-            </a:r>
-            <a:r>
-              <a:rPr lang="en-GB" baseline="0" dirty="0" smtClean="0"/>
-              <a:t>.</a:t>
+              <a:t> programming and animating. Allowing for faster production. Also we have better communication between the programmers, so we check each others code more frequently and giving feedback.</a:t>
             </a:r>
           </a:p>
           <a:p>
@@ -667,11 +649,11 @@
           <a:p>
             <a:r>
               <a:rPr lang="en-GB" dirty="0" smtClean="0"/>
-              <a:t>We have been oblivious</a:t>
+              <a:t>We got a start for simple soft coding in .txt files. Making</a:t>
             </a:r>
             <a:r>
               <a:rPr lang="en-GB" baseline="0" dirty="0" smtClean="0"/>
-              <a:t> to the fact that the leads have more of an administrative role, so we have not been having a good work distribution.</a:t>
+              <a:t> it possible for both programmers and artists to playtest the game and making tweaks.</a:t>
             </a:r>
           </a:p>
           <a:p>
@@ -683,7 +665,7 @@
           <a:p>
             <a:r>
               <a:rPr lang="en-GB" baseline="0" dirty="0" smtClean="0"/>
-              <a:t>We have also been neglecting to update the feature definition, product backlog as well as the task tracker. Meaning that someone who would join our group would not be able to understand what was going on just by looking at the SCRUM.</a:t>
+              <a:t>Before we did not have someone who could be considered a dedicated designer, who could update the design document, but now we have someone who update it quite frequently. Giving it a better and more cohesive structure.</a:t>
             </a:r>
             <a:endParaRPr lang="en-GB" dirty="0"/>
           </a:p>
@@ -706,7 +688,7 @@
           <a:p>
             <a:fld id="{6CC21AF7-C21A-416D-8B4F-6D6A47F3CA3A}" type="slidenum">
               <a:rPr lang="en-GB" smtClean="0"/>
-              <a:t>3</a:t>
+              <a:t>2</a:t>
             </a:fld>
             <a:endParaRPr lang="en-GB"/>
           </a:p>
@@ -715,7 +697,7 @@
     </p:spTree>
     <p:extLst>
       <p:ext uri="{BB962C8B-B14F-4D97-AF65-F5344CB8AC3E}">
-        <p14:creationId xmlns:p14="http://schemas.microsoft.com/office/powerpoint/2010/main" val="4028664549"/>
+        <p14:creationId xmlns:p14="http://schemas.microsoft.com/office/powerpoint/2010/main" val="2782332422"/>
       </p:ext>
     </p:extLst>
   </p:cSld>
@@ -777,11 +759,19 @@
           <a:p>
             <a:r>
               <a:rPr lang="en-GB" dirty="0" smtClean="0"/>
-              <a:t>Be</a:t>
+              <a:t>We</a:t>
             </a:r>
             <a:r>
               <a:rPr lang="en-GB" baseline="0" dirty="0" smtClean="0"/>
-              <a:t> a bit less complex on the design choices, like we have done with our boss. Instead of some monstrous boss with fire, water and wood attributes. We simple made it into a floating mask with some flames.</a:t>
+              <a:t> got quite a lot of graphical components left to draw, and also some content left to put into the game such as power ups. With just two weeks left, this is getting stressful. When we want to have as much time possible for </a:t>
+            </a:r>
+            <a:r>
+              <a:rPr lang="en-GB" baseline="0" dirty="0" err="1" smtClean="0"/>
+              <a:t>playtesting</a:t>
+            </a:r>
+            <a:r>
+              <a:rPr lang="en-GB" baseline="0" dirty="0" smtClean="0"/>
+              <a:t>.</a:t>
             </a:r>
           </a:p>
           <a:p>
@@ -792,8 +782,12 @@
           </a:p>
           <a:p>
             <a:r>
+              <a:rPr lang="en-GB" dirty="0" smtClean="0"/>
+              <a:t>We have been oblivious</a:t>
+            </a:r>
+            <a:r>
               <a:rPr lang="en-GB" baseline="0" dirty="0" smtClean="0"/>
-              <a:t>By being pessimistic we would probably have achieved the first point by itself. Also we would have accounted for more hours on smaller things, leading to different design choices.</a:t>
+              <a:t> to the fact that the leads have more of an administrative role, so we have not been having a good work distribution.</a:t>
             </a:r>
           </a:p>
           <a:p>
@@ -805,21 +799,9 @@
           <a:p>
             <a:r>
               <a:rPr lang="en-GB" baseline="0" dirty="0" smtClean="0"/>
-              <a:t>If we had defined a pipeline from the beginning instead of started working right away, we would have had a better structure and probably been working more efficiently as well.</a:t>
-            </a:r>
-          </a:p>
-          <a:p>
-            <a:r>
-              <a:rPr lang="en-GB" baseline="0" dirty="0" smtClean="0"/>
-              <a:t>4.</a:t>
-            </a:r>
-          </a:p>
-          <a:p>
-            <a:r>
-              <a:rPr lang="en-GB" baseline="0" dirty="0" smtClean="0"/>
-              <a:t>If we would have been going through the backlog, the feature definition and the task tracker once a week, it would have been much easier to update the design document.</a:t>
-            </a:r>
-            <a:endParaRPr lang="en-GB" dirty="0" smtClean="0"/>
+              <a:t>We have also been neglecting to update the feature definition, product backlog as well as the task tracker. Meaning that someone who would join our group would not be able to understand what was going on just by looking at the SCRUM.</a:t>
+            </a:r>
+            <a:endParaRPr lang="en-GB" dirty="0"/>
           </a:p>
         </p:txBody>
       </p:sp>
@@ -840,7 +822,7 @@
           <a:p>
             <a:fld id="{6CC21AF7-C21A-416D-8B4F-6D6A47F3CA3A}" type="slidenum">
               <a:rPr lang="en-GB" smtClean="0"/>
-              <a:t>4</a:t>
+              <a:t>3</a:t>
             </a:fld>
             <a:endParaRPr lang="en-GB"/>
           </a:p>
@@ -849,7 +831,7 @@
     </p:spTree>
     <p:extLst>
       <p:ext uri="{BB962C8B-B14F-4D97-AF65-F5344CB8AC3E}">
-        <p14:creationId xmlns:p14="http://schemas.microsoft.com/office/powerpoint/2010/main" val="1219394130"/>
+        <p14:creationId xmlns:p14="http://schemas.microsoft.com/office/powerpoint/2010/main" val="4028664549"/>
       </p:ext>
     </p:extLst>
   </p:cSld>
@@ -905,6 +887,140 @@
           <a:p>
             <a:r>
               <a:rPr lang="en-GB" dirty="0" smtClean="0"/>
+              <a:t>1.</a:t>
+            </a:r>
+          </a:p>
+          <a:p>
+            <a:r>
+              <a:rPr lang="en-GB" dirty="0" smtClean="0"/>
+              <a:t>Be</a:t>
+            </a:r>
+            <a:r>
+              <a:rPr lang="en-GB" baseline="0" dirty="0" smtClean="0"/>
+              <a:t> a bit less complex on the design choices, like we have done with our boss. Instead of some monstrous boss with fire, water and wood attributes. We simple made it into a floating mask with some flames.</a:t>
+            </a:r>
+          </a:p>
+          <a:p>
+            <a:r>
+              <a:rPr lang="en-GB" baseline="0" dirty="0" smtClean="0"/>
+              <a:t>2.</a:t>
+            </a:r>
+          </a:p>
+          <a:p>
+            <a:r>
+              <a:rPr lang="en-GB" baseline="0" dirty="0" smtClean="0"/>
+              <a:t>By being pessimistic we would probably have achieved the first point by itself. Also we would have accounted for more hours on smaller things, leading to different design choices.</a:t>
+            </a:r>
+          </a:p>
+          <a:p>
+            <a:r>
+              <a:rPr lang="en-GB" baseline="0" dirty="0" smtClean="0"/>
+              <a:t>3.</a:t>
+            </a:r>
+          </a:p>
+          <a:p>
+            <a:r>
+              <a:rPr lang="en-GB" baseline="0" dirty="0" smtClean="0"/>
+              <a:t>If we had defined a pipeline from the beginning instead of started working right away, we would have had a better structure and probably been working more efficiently as well.</a:t>
+            </a:r>
+          </a:p>
+          <a:p>
+            <a:r>
+              <a:rPr lang="en-GB" baseline="0" dirty="0" smtClean="0"/>
+              <a:t>4.</a:t>
+            </a:r>
+          </a:p>
+          <a:p>
+            <a:r>
+              <a:rPr lang="en-GB" baseline="0" dirty="0" smtClean="0"/>
+              <a:t>If we would have been going through the backlog, the feature definition and the task tracker once a week, it would have been much easier to update the design document.</a:t>
+            </a:r>
+            <a:endParaRPr lang="en-GB" dirty="0" smtClean="0"/>
+          </a:p>
+        </p:txBody>
+      </p:sp>
+      <p:sp>
+        <p:nvSpPr>
+          <p:cNvPr id="4" name="Slide Number Placeholder 3"/>
+          <p:cNvSpPr>
+            <a:spLocks noGrp="1"/>
+          </p:cNvSpPr>
+          <p:nvPr>
+            <p:ph type="sldNum" sz="quarter" idx="10"/>
+          </p:nvPr>
+        </p:nvSpPr>
+        <p:spPr/>
+        <p:txBody>
+          <a:bodyPr/>
+          <a:lstStyle/>
+          <a:p>
+            <a:fld id="{6CC21AF7-C21A-416D-8B4F-6D6A47F3CA3A}" type="slidenum">
+              <a:rPr lang="en-GB" smtClean="0"/>
+              <a:t>4</a:t>
+            </a:fld>
+            <a:endParaRPr lang="en-GB"/>
+          </a:p>
+        </p:txBody>
+      </p:sp>
+    </p:spTree>
+    <p:extLst>
+      <p:ext uri="{BB962C8B-B14F-4D97-AF65-F5344CB8AC3E}">
+        <p14:creationId xmlns:p14="http://schemas.microsoft.com/office/powerpoint/2010/main" val="1219394130"/>
+      </p:ext>
+    </p:extLst>
+  </p:cSld>
+  <p:clrMapOvr>
+    <a:masterClrMapping/>
+  </p:clrMapOvr>
+</p:notes>
+</file>
+
+<file path=ppt/notesSlides/notesSlide5.xml><?xml version="1.0" encoding="utf-8"?>
+<p:notes xmlns:a="http://schemas.openxmlformats.org/drawingml/2006/main" xmlns:r="http://schemas.openxmlformats.org/officeDocument/2006/relationships" xmlns:p="http://schemas.openxmlformats.org/presentationml/2006/main">
+  <p:cSld>
+    <p:spTree>
+      <p:nvGrpSpPr>
+        <p:cNvPr id="1" name=""/>
+        <p:cNvGrpSpPr/>
+        <p:nvPr/>
+      </p:nvGrpSpPr>
+      <p:grpSpPr>
+        <a:xfrm>
+          <a:off x="0" y="0"/>
+          <a:ext cx="0" cy="0"/>
+          <a:chOff x="0" y="0"/>
+          <a:chExt cx="0" cy="0"/>
+        </a:xfrm>
+      </p:grpSpPr>
+      <p:sp>
+        <p:nvSpPr>
+          <p:cNvPr id="2" name="Slide Image Placeholder 1"/>
+          <p:cNvSpPr>
+            <a:spLocks noGrp="1" noRot="1" noChangeAspect="1"/>
+          </p:cNvSpPr>
+          <p:nvPr>
+            <p:ph type="sldImg"/>
+          </p:nvPr>
+        </p:nvSpPr>
+        <p:spPr/>
+      </p:sp>
+      <p:sp>
+        <p:nvSpPr>
+          <p:cNvPr id="3" name="Notes Placeholder 2"/>
+          <p:cNvSpPr>
+            <a:spLocks noGrp="1"/>
+          </p:cNvSpPr>
+          <p:nvPr>
+            <p:ph type="body" idx="1"/>
+          </p:nvPr>
+        </p:nvSpPr>
+        <p:spPr/>
+        <p:txBody>
+          <a:bodyPr/>
+          <a:lstStyle/>
+          <a:p>
+            <a:r>
+              <a:rPr lang="en-GB" dirty="0" smtClean="0"/>
               <a:t>We should</a:t>
             </a:r>
             <a:r>
@@ -951,7 +1067,7 @@
 </p:notes>
 </file>
 
-<file path=ppt/notesSlides/notesSlide5.xml><?xml version="1.0" encoding="utf-8"?>
+<file path=ppt/notesSlides/notesSlide6.xml><?xml version="1.0" encoding="utf-8"?>
 <p:notes xmlns:a="http://schemas.openxmlformats.org/drawingml/2006/main" xmlns:r="http://schemas.openxmlformats.org/officeDocument/2006/relationships" xmlns:p="http://schemas.openxmlformats.org/presentationml/2006/main">
   <p:cSld>
     <p:spTree>
@@ -4147,17 +4263,7 @@
               <a:rPr lang="en-GB" dirty="0" smtClean="0"/>
               <a:t>Possession</a:t>
             </a:r>
-          </a:p>
-          <a:p>
-            <a:pPr marL="457200" indent="-457200" algn="l">
-              <a:buFont typeface="Arial" panose="020B0604020202020204" pitchFamily="34" charset="0"/>
-              <a:buChar char="•"/>
-            </a:pPr>
-            <a:r>
-              <a:rPr lang="en-GB" dirty="0" err="1" smtClean="0"/>
-              <a:t>Sidescroller</a:t>
-            </a:r>
-            <a:endParaRPr lang="en-GB" dirty="0"/>
+            <a:endParaRPr lang="en-GB" dirty="0" smtClean="0"/>
           </a:p>
         </p:txBody>
       </p:sp>

</xml_diff>